<commit_message>
JavaScript Fundamentals - Assignments - Operators and Expressions
</commit_message>
<xml_diff>
--- a/JavaScript Fundamentals/04. Operators and Expressions/Lecture/Operators-Expressions.pptx
+++ b/JavaScript Fundamentals/04. Operators and Expressions/Lecture/Operators-Expressions.pptx
@@ -249,7 +249,7 @@
           <a:p>
             <a:fld id="{051841CB-FB3E-44F4-9D38-03F0E1015AAE}" type="datetimeFigureOut">
               <a:rPr lang="en-US" smtClean="0"/>
-              <a:t>30-Apr-14</a:t>
+              <a:t>5/10/2014</a:t>
             </a:fld>
             <a:endParaRPr lang="en-US"/>
           </a:p>
@@ -9669,11 +9669,7 @@
             </a:r>
             <a:r>
               <a:rPr lang="en-US" dirty="0" smtClean="0"/>
-              <a:t> </a:t>
-            </a:r>
-            <a:r>
-              <a:rPr lang="en-US" dirty="0" smtClean="0"/>
-              <a:t>returns number or  </a:t>
+              <a:t> returns number or  </a:t>
             </a:r>
             <a:r>
               <a:rPr lang="en-US" dirty="0" smtClean="0">
@@ -9742,11 +9738,7 @@
             </a:r>
             <a:r>
               <a:rPr lang="en-US" dirty="0" smtClean="0"/>
-              <a:t>division of </a:t>
-            </a:r>
-            <a:r>
-              <a:rPr lang="en-US" dirty="0" smtClean="0"/>
-              <a:t>numbers</a:t>
+              <a:t>division of numbers</a:t>
             </a:r>
           </a:p>
           <a:p>
@@ -29926,23 +29918,6 @@
                 <a:cs typeface="Consolas" pitchFamily="49" charset="0"/>
               </a:rPr>
               <a:t>. </a:t>
-            </a:r>
-            <a:r>
-              <a:rPr lang="en-US" sz="2800" b="1" dirty="0" smtClean="0">
-                <a:solidFill>
-                  <a:srgbClr val="F7FFE7"/>
-                </a:solidFill>
-                <a:effectLst>
-                  <a:outerShdw blurRad="38100" dist="38100" dir="2700000" algn="tl">
-                    <a:srgbClr val="000000">
-                      <a:alpha val="43137"/>
-                    </a:srgbClr>
-                  </a:outerShdw>
-                </a:effectLst>
-                <a:latin typeface="+mn-lt"/>
-                <a:cs typeface="Consolas" pitchFamily="49" charset="0"/>
-              </a:rPr>
-              <a:t/>
             </a:r>
             <a:br>
               <a:rPr lang="en-US" sz="2800" b="1" dirty="0" smtClean="0">
@@ -31084,10 +31059,18 @@
             </a:pPr>
             <a:r>
               <a:rPr lang="en-US" sz="2800" dirty="0" smtClean="0"/>
-              <a:t>Write an expression that checks if given print (</a:t>
-            </a:r>
-            <a:r>
-              <a:rPr lang="en-US" sz="2800" dirty="0" smtClean="0">
+              <a:t>Write an expression that checks if </a:t>
+            </a:r>
+            <a:r>
+              <a:rPr lang="en-US" sz="2800" smtClean="0"/>
+              <a:t>given </a:t>
+            </a:r>
+            <a:r>
+              <a:rPr lang="en-US" sz="2800" smtClean="0"/>
+              <a:t>point(</a:t>
+            </a:r>
+            <a:r>
+              <a:rPr lang="en-US" sz="2800" smtClean="0">
                 <a:solidFill>
                   <a:schemeClr val="accent5">
                     <a:lumMod val="20000"/>

</xml_diff>